<commit_message>
Add DD (3 services)
</commit_message>
<xml_diff>
--- a/System Design/Real-Time Order Book Aggregation and Optimal Trade Execution.pptx
+++ b/System Design/Real-Time Order Book Aggregation and Optimal Trade Execution.pptx
@@ -5,10 +5,10 @@
     <p:sldMasterId id="2147483666" r:id="rId4"/>
   </p:sldMasterIdLst>
   <p:notesMasterIdLst>
-    <p:notesMasterId r:id="rId22"/>
+    <p:notesMasterId r:id="rId27"/>
   </p:notesMasterIdLst>
   <p:handoutMasterIdLst>
-    <p:handoutMasterId r:id="rId23"/>
+    <p:handoutMasterId r:id="rId28"/>
   </p:handoutMasterIdLst>
   <p:sldIdLst>
     <p:sldId id="314" r:id="rId5"/>
@@ -26,8 +26,13 @@
     <p:sldId id="331" r:id="rId17"/>
     <p:sldId id="340" r:id="rId18"/>
     <p:sldId id="333" r:id="rId19"/>
-    <p:sldId id="332" r:id="rId20"/>
-    <p:sldId id="309" r:id="rId21"/>
+    <p:sldId id="341" r:id="rId20"/>
+    <p:sldId id="342" r:id="rId21"/>
+    <p:sldId id="343" r:id="rId22"/>
+    <p:sldId id="344" r:id="rId23"/>
+    <p:sldId id="345" r:id="rId24"/>
+    <p:sldId id="332" r:id="rId25"/>
+    <p:sldId id="309" r:id="rId26"/>
   </p:sldIdLst>
   <p:sldSz cx="12192000" cy="6858000"/>
   <p:notesSz cx="6858000" cy="9144000"/>
@@ -931,7 +936,7 @@
           <a:p>
             <a:fld id="{D4B9A9E5-4F7F-4A7D-9DE1-899232329269}" type="slidenum">
               <a:rPr lang="en-US" smtClean="0"/>
-              <a:t>17</a:t>
+              <a:t>22</a:t>
             </a:fld>
             <a:endParaRPr lang="en-US" dirty="0"/>
           </a:p>
@@ -6317,7 +6322,7 @@
             </a:r>
             <a:r>
               <a:rPr lang="en-US" dirty="0"/>
-              <a:t>/trades/optimal/{trading-pair}</a:t>
+              <a:t>/trades/routes</a:t>
             </a:r>
           </a:p>
           <a:p>
@@ -6325,6 +6330,28 @@
             <a:r>
               <a:rPr lang="en-US" dirty="0"/>
               <a:t>Parameters:</a:t>
+            </a:r>
+          </a:p>
+          <a:p>
+            <a:pPr lvl="2"/>
+            <a:r>
+              <a:rPr lang="en-US" dirty="0" err="1"/>
+              <a:t>Base_token</a:t>
+            </a:r>
+            <a:r>
+              <a:rPr lang="en-US" dirty="0"/>
+              <a:t> (string)</a:t>
+            </a:r>
+          </a:p>
+          <a:p>
+            <a:pPr lvl="2"/>
+            <a:r>
+              <a:rPr lang="en-US" dirty="0" err="1"/>
+              <a:t>Quote_token</a:t>
+            </a:r>
+            <a:r>
+              <a:rPr lang="en-US" dirty="0"/>
+              <a:t> (string)</a:t>
             </a:r>
           </a:p>
           <a:p>
@@ -6462,7 +6489,9 @@
         </p:nvSpPr>
         <p:spPr/>
         <p:txBody>
-          <a:bodyPr/>
+          <a:bodyPr>
+            <a:normAutofit lnSpcReduction="10000"/>
+          </a:bodyPr>
           <a:lstStyle/>
           <a:p>
             <a:pPr marL="457200" indent="-457200">
@@ -6494,6 +6523,21 @@
             <a:r>
               <a:rPr lang="en-US" dirty="0"/>
               <a:t>Request body:</a:t>
+            </a:r>
+          </a:p>
+          <a:p>
+            <a:pPr lvl="2"/>
+            <a:r>
+              <a:rPr lang="en-US" dirty="0"/>
+              <a:t>“</a:t>
+            </a:r>
+            <a:r>
+              <a:rPr lang="en-US" dirty="0" err="1"/>
+              <a:t>trade_route</a:t>
+            </a:r>
+            <a:r>
+              <a:rPr lang="en-US" dirty="0"/>
+              <a:t>” (optional – referenced from previous API)</a:t>
             </a:r>
           </a:p>
           <a:p>
@@ -14813,7 +14857,60 @@
           <a:bodyPr/>
           <a:lstStyle/>
           <a:p>
-            <a:endParaRPr lang="en-US"/>
+            <a:pPr marL="457200" indent="-457200">
+              <a:buFont typeface="+mj-lt"/>
+              <a:buAutoNum type="arabicPeriod"/>
+            </a:pPr>
+            <a:r>
+              <a:rPr lang="en-US" b="1" dirty="0"/>
+              <a:t>DATA AGGREGATION SERVICE</a:t>
+            </a:r>
+          </a:p>
+          <a:p>
+            <a:pPr lvl="1"/>
+            <a:r>
+              <a:rPr lang="en-US" dirty="0"/>
+              <a:t>Functionalities</a:t>
+            </a:r>
+          </a:p>
+          <a:p>
+            <a:pPr lvl="2"/>
+            <a:r>
+              <a:rPr lang="en-US" dirty="0"/>
+              <a:t>Manage connection to Exchange API</a:t>
+            </a:r>
+          </a:p>
+          <a:p>
+            <a:pPr lvl="2"/>
+            <a:r>
+              <a:rPr lang="en-US" dirty="0"/>
+              <a:t>Fetch token data &amp; store to DB and Cache</a:t>
+            </a:r>
+          </a:p>
+          <a:p>
+            <a:pPr lvl="2"/>
+            <a:r>
+              <a:rPr lang="en-US" dirty="0"/>
+              <a:t>Fetch order book data</a:t>
+            </a:r>
+          </a:p>
+          <a:p>
+            <a:pPr lvl="2"/>
+            <a:r>
+              <a:rPr lang="en-US" dirty="0"/>
+              <a:t>Parse, validate &amp; store order book data to DB and Cache</a:t>
+            </a:r>
+          </a:p>
+          <a:p>
+            <a:pPr lvl="2"/>
+            <a:r>
+              <a:rPr lang="en-US" dirty="0"/>
+              <a:t>Respond to requests for data from Clients</a:t>
+            </a:r>
+          </a:p>
+          <a:p>
+            <a:pPr lvl="1"/>
+            <a:endParaRPr lang="en-US" dirty="0"/>
           </a:p>
         </p:txBody>
       </p:sp>
@@ -14868,7 +14965,7 @@
         <p:cNvPr id="1" name="">
           <a:extLst>
             <a:ext uri="{FF2B5EF4-FFF2-40B4-BE49-F238E27FC236}">
-              <a16:creationId xmlns:a16="http://schemas.microsoft.com/office/drawing/2014/main" id="{66367792-D6CE-0885-A6FA-101739F774E1}"/>
+              <a16:creationId xmlns:a16="http://schemas.microsoft.com/office/drawing/2014/main" id="{A17A39B9-B435-C25B-E01A-B6D8B6FF122C}"/>
             </a:ext>
           </a:extLst>
         </p:cNvPr>
@@ -14888,7 +14985,7 @@
           <p:cNvPr id="2" name="Title 1">
             <a:extLst>
               <a:ext uri="{FF2B5EF4-FFF2-40B4-BE49-F238E27FC236}">
-                <a16:creationId xmlns:a16="http://schemas.microsoft.com/office/drawing/2014/main" id="{2D90199A-896E-13AD-01E0-6214D96F2A6E}"/>
+                <a16:creationId xmlns:a16="http://schemas.microsoft.com/office/drawing/2014/main" id="{345143B2-5FD4-669B-1FB4-982B271ABBB1}"/>
               </a:ext>
             </a:extLst>
           </p:cNvPr>
@@ -14906,7 +15003,7 @@
           <a:p>
             <a:r>
               <a:rPr lang="en-US" b="1" dirty="0"/>
-              <a:t>7. Identifying &amp; Resolving Bottlenecks</a:t>
+              <a:t>6. Detailed Design</a:t>
             </a:r>
           </a:p>
         </p:txBody>
@@ -14916,7 +15013,7 @@
           <p:cNvPr id="3" name="Table Placeholder 2">
             <a:extLst>
               <a:ext uri="{FF2B5EF4-FFF2-40B4-BE49-F238E27FC236}">
-                <a16:creationId xmlns:a16="http://schemas.microsoft.com/office/drawing/2014/main" id="{B7F795F9-5FE8-A681-0D90-CE62B1159092}"/>
+                <a16:creationId xmlns:a16="http://schemas.microsoft.com/office/drawing/2014/main" id="{F956041C-6453-AE95-6B1B-FAF78DF99FC4}"/>
               </a:ext>
             </a:extLst>
           </p:cNvPr>
@@ -14932,7 +15029,14 @@
           <a:bodyPr/>
           <a:lstStyle/>
           <a:p>
-            <a:endParaRPr lang="en-US"/>
+            <a:pPr marL="457200" indent="-457200">
+              <a:buFont typeface="+mj-lt"/>
+              <a:buAutoNum type="arabicPeriod"/>
+            </a:pPr>
+            <a:r>
+              <a:rPr lang="en-US" b="1" dirty="0"/>
+              <a:t>DATA AGGREGATION SERVICE</a:t>
+            </a:r>
           </a:p>
         </p:txBody>
       </p:sp>
@@ -14941,7 +15045,7 @@
           <p:cNvPr id="4" name="Slide Number Placeholder 3">
             <a:extLst>
               <a:ext uri="{FF2B5EF4-FFF2-40B4-BE49-F238E27FC236}">
-                <a16:creationId xmlns:a16="http://schemas.microsoft.com/office/drawing/2014/main" id="{21DD60F2-91DC-B665-749E-7683E2211724}"/>
+                <a16:creationId xmlns:a16="http://schemas.microsoft.com/office/drawing/2014/main" id="{549CE367-D1B8-BB2B-60F4-056B26EB51EC}"/>
               </a:ext>
             </a:extLst>
           </p:cNvPr>
@@ -14966,10 +15070,57 @@
           </a:p>
         </p:txBody>
       </p:sp>
+      <p:pic>
+        <p:nvPicPr>
+          <p:cNvPr id="2050" name="Picture 2">
+            <a:extLst>
+              <a:ext uri="{FF2B5EF4-FFF2-40B4-BE49-F238E27FC236}">
+                <a16:creationId xmlns:a16="http://schemas.microsoft.com/office/drawing/2014/main" id="{9F19588D-8611-2C62-CB48-9A7C096CC36C}"/>
+              </a:ext>
+            </a:extLst>
+          </p:cNvPr>
+          <p:cNvPicPr>
+            <a:picLocks noChangeAspect="1" noChangeArrowheads="1"/>
+          </p:cNvPicPr>
+          <p:nvPr/>
+        </p:nvPicPr>
+        <p:blipFill>
+          <a:blip r:embed="rId2">
+            <a:extLst>
+              <a:ext uri="{28A0092B-C50C-407E-A947-70E740481C1C}">
+                <a14:useLocalDpi xmlns:a14="http://schemas.microsoft.com/office/drawing/2010/main" val="0"/>
+              </a:ext>
+            </a:extLst>
+          </a:blip>
+          <a:srcRect/>
+          <a:stretch>
+            <a:fillRect/>
+          </a:stretch>
+        </p:blipFill>
+        <p:spPr bwMode="auto">
+          <a:xfrm>
+            <a:off x="2515897" y="2522918"/>
+            <a:ext cx="8296275" cy="4019550"/>
+          </a:xfrm>
+          <a:prstGeom prst="rect">
+            <a:avLst/>
+          </a:prstGeom>
+          <a:noFill/>
+          <a:extLst>
+            <a:ext uri="{909E8E84-426E-40DD-AFC4-6F175D3DCCD1}">
+              <a14:hiddenFill xmlns:a14="http://schemas.microsoft.com/office/drawing/2010/main">
+                <a:solidFill>
+                  <a:srgbClr val="FFFFFF"/>
+                </a:solidFill>
+              </a14:hiddenFill>
+            </a:ext>
+          </a:extLst>
+        </p:spPr>
+      </p:pic>
     </p:spTree>
     <p:extLst>
       <p:ext uri="{BB962C8B-B14F-4D97-AF65-F5344CB8AC3E}">
-        <p14:creationId xmlns:p14="http://schemas.microsoft.com/office/powerpoint/2010/main" val="3135018115"/>
+        <p14:creationId xmlns:p14="http://schemas.microsoft.com/office/powerpoint/2010/main" val="1640735436"/>
       </p:ext>
     </p:extLst>
   </p:cSld>
@@ -14982,17 +15133,15 @@
 <file path=ppt/slides/slide17.xml><?xml version="1.0" encoding="utf-8"?>
 <p:sld xmlns:a="http://schemas.openxmlformats.org/drawingml/2006/main" xmlns:r="http://schemas.openxmlformats.org/officeDocument/2006/relationships" xmlns:p="http://schemas.openxmlformats.org/presentationml/2006/main">
   <p:cSld>
-    <p:bg>
-      <p:bgPr>
-        <a:solidFill>
-          <a:schemeClr val="tx1"/>
-        </a:solidFill>
-        <a:effectLst/>
-      </p:bgPr>
-    </p:bg>
     <p:spTree>
       <p:nvGrpSpPr>
-        <p:cNvPr id="1" name=""/>
+        <p:cNvPr id="1" name="">
+          <a:extLst>
+            <a:ext uri="{FF2B5EF4-FFF2-40B4-BE49-F238E27FC236}">
+              <a16:creationId xmlns:a16="http://schemas.microsoft.com/office/drawing/2014/main" id="{94CAB055-9D18-DDF5-C9D2-4F4FFDF7E90F}"/>
+            </a:ext>
+          </a:extLst>
+        </p:cNvPr>
         <p:cNvGrpSpPr/>
         <p:nvPr/>
       </p:nvGrpSpPr>
@@ -15004,50 +15153,12 @@
           <a:chExt cx="0" cy="0"/>
         </a:xfrm>
       </p:grpSpPr>
-      <p:pic>
-        <p:nvPicPr>
-          <p:cNvPr id="3" name="Graphic 2">
+      <p:sp>
+        <p:nvSpPr>
+          <p:cNvPr id="2" name="Title 1">
             <a:extLst>
               <a:ext uri="{FF2B5EF4-FFF2-40B4-BE49-F238E27FC236}">
-                <a16:creationId xmlns:a16="http://schemas.microsoft.com/office/drawing/2014/main" id="{77B52831-0916-294C-0ACB-9774B9805D9B}"/>
-              </a:ext>
-              <a:ext uri="{C183D7F6-B498-43B3-948B-1728B52AA6E4}">
-                <adec:decorative xmlns:adec="http://schemas.microsoft.com/office/drawing/2017/decorative" val="1"/>
-              </a:ext>
-            </a:extLst>
-          </p:cNvPr>
-          <p:cNvPicPr>
-            <a:picLocks noChangeAspect="1"/>
-          </p:cNvPicPr>
-          <p:nvPr/>
-        </p:nvPicPr>
-        <p:blipFill rotWithShape="1">
-          <a:blip r:embed="rId3">
-            <a:extLst>
-              <a:ext uri="{96DAC541-7B7A-43D3-8B79-37D633B846F1}">
-                <asvg:svgBlip xmlns:asvg="http://schemas.microsoft.com/office/drawing/2016/SVG/main" r:embed="rId4"/>
-              </a:ext>
-            </a:extLst>
-          </a:blip>
-          <a:srcRect l="4151" r="18577"/>
-          <a:stretch/>
-        </p:blipFill>
-        <p:spPr>
-          <a:xfrm flipH="1">
-            <a:off x="0" y="0"/>
-            <a:ext cx="5181600" cy="6858000"/>
-          </a:xfrm>
-          <a:prstGeom prst="rect">
-            <a:avLst/>
-          </a:prstGeom>
-        </p:spPr>
-      </p:pic>
-      <p:sp>
-        <p:nvSpPr>
-          <p:cNvPr id="7" name="Title 6">
-            <a:extLst>
-              <a:ext uri="{FF2B5EF4-FFF2-40B4-BE49-F238E27FC236}">
-                <a16:creationId xmlns:a16="http://schemas.microsoft.com/office/drawing/2014/main" id="{E82E216E-9EE0-9D3F-D692-083F575A3D04}"/>
+                <a16:creationId xmlns:a16="http://schemas.microsoft.com/office/drawing/2014/main" id="{DD42D920-BFE8-250F-6558-61C3B9ED02B9}"/>
               </a:ext>
             </a:extLst>
           </p:cNvPr>
@@ -15058,29 +15169,24 @@
             <p:ph type="title"/>
           </p:nvPr>
         </p:nvSpPr>
-        <p:spPr>
-          <a:xfrm>
-            <a:off x="6091515" y="374090"/>
-            <a:ext cx="5057104" cy="3624984"/>
-          </a:xfrm>
-        </p:spPr>
+        <p:spPr/>
         <p:txBody>
           <a:bodyPr/>
           <a:lstStyle/>
           <a:p>
             <a:r>
-              <a:rPr lang="en-US" dirty="0"/>
-              <a:t>Thank you</a:t>
+              <a:rPr lang="en-US" b="1" dirty="0"/>
+              <a:t>6. Detailed Design</a:t>
             </a:r>
           </a:p>
         </p:txBody>
       </p:sp>
       <p:sp>
         <p:nvSpPr>
-          <p:cNvPr id="10" name="Content Placeholder 9">
+          <p:cNvPr id="3" name="Table Placeholder 2">
             <a:extLst>
               <a:ext uri="{FF2B5EF4-FFF2-40B4-BE49-F238E27FC236}">
-                <a16:creationId xmlns:a16="http://schemas.microsoft.com/office/drawing/2014/main" id="{1F398FDD-E639-CF6A-B875-443655F2B31B}"/>
+                <a16:creationId xmlns:a16="http://schemas.microsoft.com/office/drawing/2014/main" id="{1CE2405C-B041-9014-988B-7BC27E17B76A}"/>
               </a:ext>
             </a:extLst>
           </p:cNvPr>
@@ -15088,29 +15194,125 @@
             <a:spLocks noGrp="1"/>
           </p:cNvSpPr>
           <p:nvPr>
-            <p:ph idx="1"/>
+            <p:ph type="tbl" sz="quarter" idx="10"/>
           </p:nvPr>
         </p:nvSpPr>
-        <p:spPr>
-          <a:xfrm>
-            <a:off x="6091514" y="4172989"/>
-            <a:ext cx="5057103" cy="2519363"/>
-          </a:xfrm>
-        </p:spPr>
+        <p:spPr/>
         <p:txBody>
           <a:bodyPr/>
           <a:lstStyle/>
           <a:p>
-            <a:r>
-              <a:rPr lang="en-US" dirty="0"/>
-              <a:t>Thanh Nguyen</a:t>
-            </a:r>
-          </a:p>
-          <a:p>
-            <a:r>
-              <a:rPr lang="en-US" dirty="0" err="1"/>
-              <a:t>ndthanh2605@gmail.com</a:t>
-            </a:r>
+            <a:pPr marL="457200" indent="-457200">
+              <a:buFont typeface="+mj-lt"/>
+              <a:buAutoNum type="arabicPeriod" startAt="2"/>
+            </a:pPr>
+            <a:r>
+              <a:rPr lang="en-US" b="1" dirty="0"/>
+              <a:t>OPTIMAL TRADE SERVICE</a:t>
+            </a:r>
+          </a:p>
+          <a:p>
+            <a:pPr lvl="1"/>
+            <a:r>
+              <a:rPr lang="en-US" dirty="0"/>
+              <a:t>Functionalities</a:t>
+            </a:r>
+          </a:p>
+          <a:p>
+            <a:pPr lvl="2"/>
+            <a:r>
+              <a:rPr lang="en-US" dirty="0"/>
+              <a:t>Receive requests for best trade route from Clients</a:t>
+            </a:r>
+          </a:p>
+          <a:p>
+            <a:pPr lvl="2"/>
+            <a:r>
+              <a:rPr lang="en-US" dirty="0"/>
+              <a:t>Read all necessary from Cache (or DB)</a:t>
+            </a:r>
+          </a:p>
+          <a:p>
+            <a:pPr lvl="3"/>
+            <a:r>
+              <a:rPr lang="en-US" dirty="0"/>
+              <a:t>Tokens, Trading pairs</a:t>
+            </a:r>
+          </a:p>
+          <a:p>
+            <a:pPr lvl="3"/>
+            <a:r>
+              <a:rPr lang="en-US" dirty="0"/>
+              <a:t>Order books</a:t>
+            </a:r>
+          </a:p>
+          <a:p>
+            <a:pPr lvl="2"/>
+            <a:r>
+              <a:rPr lang="en-US" dirty="0"/>
+              <a:t>Run Shortest Path algorithm</a:t>
+            </a:r>
+          </a:p>
+          <a:p>
+            <a:pPr lvl="3"/>
+            <a:r>
+              <a:rPr lang="en-US" dirty="0"/>
+              <a:t>Support Multi-hops</a:t>
+            </a:r>
+          </a:p>
+          <a:p>
+            <a:pPr lvl="2"/>
+            <a:r>
+              <a:rPr lang="en-US" dirty="0"/>
+              <a:t>Store calculated route to Cache</a:t>
+            </a:r>
+          </a:p>
+          <a:p>
+            <a:pPr lvl="3"/>
+            <a:r>
+              <a:rPr lang="en-US" dirty="0"/>
+              <a:t>Short TTL</a:t>
+            </a:r>
+          </a:p>
+          <a:p>
+            <a:pPr lvl="2"/>
+            <a:r>
+              <a:rPr lang="en-US" dirty="0"/>
+              <a:t>Respond to Clients</a:t>
+            </a:r>
+          </a:p>
+          <a:p>
+            <a:pPr lvl="1"/>
+            <a:endParaRPr lang="en-US" dirty="0"/>
+          </a:p>
+        </p:txBody>
+      </p:sp>
+      <p:sp>
+        <p:nvSpPr>
+          <p:cNvPr id="4" name="Slide Number Placeholder 3">
+            <a:extLst>
+              <a:ext uri="{FF2B5EF4-FFF2-40B4-BE49-F238E27FC236}">
+                <a16:creationId xmlns:a16="http://schemas.microsoft.com/office/drawing/2014/main" id="{89ECDE24-E381-3E65-1E5A-6D387A214727}"/>
+              </a:ext>
+            </a:extLst>
+          </p:cNvPr>
+          <p:cNvSpPr>
+            <a:spLocks noGrp="1"/>
+          </p:cNvSpPr>
+          <p:nvPr>
+            <p:ph type="sldNum" sz="quarter" idx="4"/>
+          </p:nvPr>
+        </p:nvSpPr>
+        <p:spPr/>
+        <p:txBody>
+          <a:bodyPr/>
+          <a:lstStyle/>
+          <a:p>
+            <a:fld id="{B5CEABB6-07DC-46E8-9B57-56EC44A396E5}" type="slidenum">
+              <a:rPr lang="en-US" smtClean="0"/>
+              <a:pPr/>
+              <a:t>17</a:t>
+            </a:fld>
             <a:endParaRPr lang="en-US" dirty="0"/>
           </a:p>
         </p:txBody>
@@ -15118,7 +15320,367 @@
     </p:spTree>
     <p:extLst>
       <p:ext uri="{BB962C8B-B14F-4D97-AF65-F5344CB8AC3E}">
-        <p14:creationId xmlns:p14="http://schemas.microsoft.com/office/powerpoint/2010/main" val="769932640"/>
+        <p14:creationId xmlns:p14="http://schemas.microsoft.com/office/powerpoint/2010/main" val="506279309"/>
+      </p:ext>
+    </p:extLst>
+  </p:cSld>
+  <p:clrMapOvr>
+    <a:masterClrMapping/>
+  </p:clrMapOvr>
+</p:sld>
+</file>
+
+<file path=ppt/slides/slide18.xml><?xml version="1.0" encoding="utf-8"?>
+<p:sld xmlns:a="http://schemas.openxmlformats.org/drawingml/2006/main" xmlns:r="http://schemas.openxmlformats.org/officeDocument/2006/relationships" xmlns:p="http://schemas.openxmlformats.org/presentationml/2006/main">
+  <p:cSld>
+    <p:spTree>
+      <p:nvGrpSpPr>
+        <p:cNvPr id="1" name="">
+          <a:extLst>
+            <a:ext uri="{FF2B5EF4-FFF2-40B4-BE49-F238E27FC236}">
+              <a16:creationId xmlns:a16="http://schemas.microsoft.com/office/drawing/2014/main" id="{447AB4B4-4C95-114A-0672-6539FF49474E}"/>
+            </a:ext>
+          </a:extLst>
+        </p:cNvPr>
+        <p:cNvGrpSpPr/>
+        <p:nvPr/>
+      </p:nvGrpSpPr>
+      <p:grpSpPr>
+        <a:xfrm>
+          <a:off x="0" y="0"/>
+          <a:ext cx="0" cy="0"/>
+          <a:chOff x="0" y="0"/>
+          <a:chExt cx="0" cy="0"/>
+        </a:xfrm>
+      </p:grpSpPr>
+      <p:sp>
+        <p:nvSpPr>
+          <p:cNvPr id="2" name="Title 1">
+            <a:extLst>
+              <a:ext uri="{FF2B5EF4-FFF2-40B4-BE49-F238E27FC236}">
+                <a16:creationId xmlns:a16="http://schemas.microsoft.com/office/drawing/2014/main" id="{C8B17F14-5D8F-41B7-2123-59AC114B2A7F}"/>
+              </a:ext>
+            </a:extLst>
+          </p:cNvPr>
+          <p:cNvSpPr>
+            <a:spLocks noGrp="1"/>
+          </p:cNvSpPr>
+          <p:nvPr>
+            <p:ph type="title"/>
+          </p:nvPr>
+        </p:nvSpPr>
+        <p:spPr/>
+        <p:txBody>
+          <a:bodyPr/>
+          <a:lstStyle/>
+          <a:p>
+            <a:r>
+              <a:rPr lang="en-US" b="1" dirty="0"/>
+              <a:t>6. Detailed Design</a:t>
+            </a:r>
+          </a:p>
+        </p:txBody>
+      </p:sp>
+      <p:sp>
+        <p:nvSpPr>
+          <p:cNvPr id="3" name="Table Placeholder 2">
+            <a:extLst>
+              <a:ext uri="{FF2B5EF4-FFF2-40B4-BE49-F238E27FC236}">
+                <a16:creationId xmlns:a16="http://schemas.microsoft.com/office/drawing/2014/main" id="{43CADA17-FF6D-6D47-B46E-FF658E064324}"/>
+              </a:ext>
+            </a:extLst>
+          </p:cNvPr>
+          <p:cNvSpPr>
+            <a:spLocks noGrp="1"/>
+          </p:cNvSpPr>
+          <p:nvPr>
+            <p:ph type="tbl" sz="quarter" idx="10"/>
+          </p:nvPr>
+        </p:nvSpPr>
+        <p:spPr/>
+        <p:txBody>
+          <a:bodyPr/>
+          <a:lstStyle/>
+          <a:p>
+            <a:pPr marL="457200" indent="-457200">
+              <a:buFont typeface="+mj-lt"/>
+              <a:buAutoNum type="arabicPeriod" startAt="2"/>
+            </a:pPr>
+            <a:r>
+              <a:rPr lang="en-US" b="1" dirty="0"/>
+              <a:t>OPTIMAL TRADE SERVICE</a:t>
+            </a:r>
+          </a:p>
+          <a:p>
+            <a:pPr lvl="1"/>
+            <a:endParaRPr lang="en-US" dirty="0"/>
+          </a:p>
+        </p:txBody>
+      </p:sp>
+      <p:sp>
+        <p:nvSpPr>
+          <p:cNvPr id="4" name="Slide Number Placeholder 3">
+            <a:extLst>
+              <a:ext uri="{FF2B5EF4-FFF2-40B4-BE49-F238E27FC236}">
+                <a16:creationId xmlns:a16="http://schemas.microsoft.com/office/drawing/2014/main" id="{79B67DC2-1A81-0FAE-24EF-ED70FCB5A628}"/>
+              </a:ext>
+            </a:extLst>
+          </p:cNvPr>
+          <p:cNvSpPr>
+            <a:spLocks noGrp="1"/>
+          </p:cNvSpPr>
+          <p:nvPr>
+            <p:ph type="sldNum" sz="quarter" idx="4"/>
+          </p:nvPr>
+        </p:nvSpPr>
+        <p:spPr/>
+        <p:txBody>
+          <a:bodyPr/>
+          <a:lstStyle/>
+          <a:p>
+            <a:fld id="{B5CEABB6-07DC-46E8-9B57-56EC44A396E5}" type="slidenum">
+              <a:rPr lang="en-US" smtClean="0"/>
+              <a:pPr/>
+              <a:t>18</a:t>
+            </a:fld>
+            <a:endParaRPr lang="en-US" dirty="0"/>
+          </a:p>
+        </p:txBody>
+      </p:sp>
+      <p:pic>
+        <p:nvPicPr>
+          <p:cNvPr id="3074" name="Picture 2">
+            <a:extLst>
+              <a:ext uri="{FF2B5EF4-FFF2-40B4-BE49-F238E27FC236}">
+                <a16:creationId xmlns:a16="http://schemas.microsoft.com/office/drawing/2014/main" id="{A6BCF33A-46D9-C704-1CC0-5C73FEFFDB06}"/>
+              </a:ext>
+            </a:extLst>
+          </p:cNvPr>
+          <p:cNvPicPr>
+            <a:picLocks noChangeAspect="1" noChangeArrowheads="1"/>
+          </p:cNvPicPr>
+          <p:nvPr/>
+        </p:nvPicPr>
+        <p:blipFill>
+          <a:blip r:embed="rId2">
+            <a:extLst>
+              <a:ext uri="{28A0092B-C50C-407E-A947-70E740481C1C}">
+                <a14:useLocalDpi xmlns:a14="http://schemas.microsoft.com/office/drawing/2010/main" val="0"/>
+              </a:ext>
+            </a:extLst>
+          </a:blip>
+          <a:srcRect/>
+          <a:stretch>
+            <a:fillRect/>
+          </a:stretch>
+        </p:blipFill>
+        <p:spPr bwMode="auto">
+          <a:xfrm>
+            <a:off x="2830222" y="2532443"/>
+            <a:ext cx="7667625" cy="4010025"/>
+          </a:xfrm>
+          <a:prstGeom prst="rect">
+            <a:avLst/>
+          </a:prstGeom>
+          <a:noFill/>
+          <a:extLst>
+            <a:ext uri="{909E8E84-426E-40DD-AFC4-6F175D3DCCD1}">
+              <a14:hiddenFill xmlns:a14="http://schemas.microsoft.com/office/drawing/2010/main">
+                <a:solidFill>
+                  <a:srgbClr val="FFFFFF"/>
+                </a:solidFill>
+              </a14:hiddenFill>
+            </a:ext>
+          </a:extLst>
+        </p:spPr>
+      </p:pic>
+    </p:spTree>
+    <p:extLst>
+      <p:ext uri="{BB962C8B-B14F-4D97-AF65-F5344CB8AC3E}">
+        <p14:creationId xmlns:p14="http://schemas.microsoft.com/office/powerpoint/2010/main" val="1829422746"/>
+      </p:ext>
+    </p:extLst>
+  </p:cSld>
+  <p:clrMapOvr>
+    <a:masterClrMapping/>
+  </p:clrMapOvr>
+</p:sld>
+</file>
+
+<file path=ppt/slides/slide19.xml><?xml version="1.0" encoding="utf-8"?>
+<p:sld xmlns:a="http://schemas.openxmlformats.org/drawingml/2006/main" xmlns:r="http://schemas.openxmlformats.org/officeDocument/2006/relationships" xmlns:p="http://schemas.openxmlformats.org/presentationml/2006/main">
+  <p:cSld>
+    <p:spTree>
+      <p:nvGrpSpPr>
+        <p:cNvPr id="1" name="">
+          <a:extLst>
+            <a:ext uri="{FF2B5EF4-FFF2-40B4-BE49-F238E27FC236}">
+              <a16:creationId xmlns:a16="http://schemas.microsoft.com/office/drawing/2014/main" id="{E4F352BC-5EE1-4509-D1D3-FC4AB5820A27}"/>
+            </a:ext>
+          </a:extLst>
+        </p:cNvPr>
+        <p:cNvGrpSpPr/>
+        <p:nvPr/>
+      </p:nvGrpSpPr>
+      <p:grpSpPr>
+        <a:xfrm>
+          <a:off x="0" y="0"/>
+          <a:ext cx="0" cy="0"/>
+          <a:chOff x="0" y="0"/>
+          <a:chExt cx="0" cy="0"/>
+        </a:xfrm>
+      </p:grpSpPr>
+      <p:sp>
+        <p:nvSpPr>
+          <p:cNvPr id="2" name="Title 1">
+            <a:extLst>
+              <a:ext uri="{FF2B5EF4-FFF2-40B4-BE49-F238E27FC236}">
+                <a16:creationId xmlns:a16="http://schemas.microsoft.com/office/drawing/2014/main" id="{B66E282C-9EC8-D6E8-609E-AB72E8E066F6}"/>
+              </a:ext>
+            </a:extLst>
+          </p:cNvPr>
+          <p:cNvSpPr>
+            <a:spLocks noGrp="1"/>
+          </p:cNvSpPr>
+          <p:nvPr>
+            <p:ph type="title"/>
+          </p:nvPr>
+        </p:nvSpPr>
+        <p:spPr/>
+        <p:txBody>
+          <a:bodyPr/>
+          <a:lstStyle/>
+          <a:p>
+            <a:r>
+              <a:rPr lang="en-US" b="1" dirty="0"/>
+              <a:t>6. Detailed Design</a:t>
+            </a:r>
+          </a:p>
+        </p:txBody>
+      </p:sp>
+      <p:sp>
+        <p:nvSpPr>
+          <p:cNvPr id="3" name="Table Placeholder 2">
+            <a:extLst>
+              <a:ext uri="{FF2B5EF4-FFF2-40B4-BE49-F238E27FC236}">
+                <a16:creationId xmlns:a16="http://schemas.microsoft.com/office/drawing/2014/main" id="{C270096B-8405-C6CA-8061-5D08C4E418D8}"/>
+              </a:ext>
+            </a:extLst>
+          </p:cNvPr>
+          <p:cNvSpPr>
+            <a:spLocks noGrp="1"/>
+          </p:cNvSpPr>
+          <p:nvPr>
+            <p:ph type="tbl" sz="quarter" idx="10"/>
+          </p:nvPr>
+        </p:nvSpPr>
+        <p:spPr/>
+        <p:txBody>
+          <a:bodyPr/>
+          <a:lstStyle/>
+          <a:p>
+            <a:pPr marL="457200" indent="-457200">
+              <a:buFont typeface="+mj-lt"/>
+              <a:buAutoNum type="arabicPeriod" startAt="3"/>
+            </a:pPr>
+            <a:r>
+              <a:rPr lang="en-US" b="1" dirty="0"/>
+              <a:t>TRADE ORDER SERVICE</a:t>
+            </a:r>
+          </a:p>
+          <a:p>
+            <a:pPr lvl="1"/>
+            <a:r>
+              <a:rPr lang="en-US" dirty="0"/>
+              <a:t>Functionalities</a:t>
+            </a:r>
+          </a:p>
+          <a:p>
+            <a:pPr lvl="2"/>
+            <a:r>
+              <a:rPr lang="en-US" dirty="0"/>
+              <a:t>Receive requests for ordering trades from Clients</a:t>
+            </a:r>
+          </a:p>
+          <a:p>
+            <a:pPr lvl="2"/>
+            <a:r>
+              <a:rPr lang="en-US" dirty="0"/>
+              <a:t>Validate requests</a:t>
+            </a:r>
+          </a:p>
+          <a:p>
+            <a:pPr lvl="2"/>
+            <a:r>
+              <a:rPr lang="en-US" dirty="0"/>
+              <a:t>If request contains “</a:t>
+            </a:r>
+            <a:r>
+              <a:rPr lang="en-US" dirty="0" err="1"/>
+              <a:t>trade_route</a:t>
+            </a:r>
+            <a:r>
+              <a:rPr lang="en-US" dirty="0"/>
+              <a:t>” (calculated optimal route), query route details from Cache</a:t>
+            </a:r>
+          </a:p>
+          <a:p>
+            <a:pPr lvl="2"/>
+            <a:r>
+              <a:rPr lang="en-US" dirty="0"/>
+              <a:t>Send order request to exchange API</a:t>
+            </a:r>
+          </a:p>
+          <a:p>
+            <a:pPr lvl="2"/>
+            <a:r>
+              <a:rPr lang="en-US" dirty="0"/>
+              <a:t>Store trade orders in DB and update order status</a:t>
+            </a:r>
+          </a:p>
+          <a:p>
+            <a:pPr lvl="2"/>
+            <a:r>
+              <a:rPr lang="en-US" dirty="0"/>
+              <a:t>Handle errors received from exchange </a:t>
+            </a:r>
+          </a:p>
+        </p:txBody>
+      </p:sp>
+      <p:sp>
+        <p:nvSpPr>
+          <p:cNvPr id="4" name="Slide Number Placeholder 3">
+            <a:extLst>
+              <a:ext uri="{FF2B5EF4-FFF2-40B4-BE49-F238E27FC236}">
+                <a16:creationId xmlns:a16="http://schemas.microsoft.com/office/drawing/2014/main" id="{3CB504F9-2588-1396-E90E-D90FE0A78A12}"/>
+              </a:ext>
+            </a:extLst>
+          </p:cNvPr>
+          <p:cNvSpPr>
+            <a:spLocks noGrp="1"/>
+          </p:cNvSpPr>
+          <p:nvPr>
+            <p:ph type="sldNum" sz="quarter" idx="4"/>
+          </p:nvPr>
+        </p:nvSpPr>
+        <p:spPr/>
+        <p:txBody>
+          <a:bodyPr/>
+          <a:lstStyle/>
+          <a:p>
+            <a:fld id="{B5CEABB6-07DC-46E8-9B57-56EC44A396E5}" type="slidenum">
+              <a:rPr lang="en-US" smtClean="0"/>
+              <a:pPr/>
+              <a:t>19</a:t>
+            </a:fld>
+            <a:endParaRPr lang="en-US" dirty="0"/>
+          </a:p>
+        </p:txBody>
+      </p:sp>
+    </p:spTree>
+    <p:extLst>
+      <p:ext uri="{BB962C8B-B14F-4D97-AF65-F5344CB8AC3E}">
+        <p14:creationId xmlns:p14="http://schemas.microsoft.com/office/powerpoint/2010/main" val="3496722010"/>
       </p:ext>
     </p:extLst>
   </p:cSld>
@@ -15318,6 +15880,461 @@
     <p:extLst>
       <p:ext uri="{BB962C8B-B14F-4D97-AF65-F5344CB8AC3E}">
         <p14:creationId xmlns:p14="http://schemas.microsoft.com/office/powerpoint/2010/main" val="1713219598"/>
+      </p:ext>
+    </p:extLst>
+  </p:cSld>
+  <p:clrMapOvr>
+    <a:masterClrMapping/>
+  </p:clrMapOvr>
+</p:sld>
+</file>
+
+<file path=ppt/slides/slide20.xml><?xml version="1.0" encoding="utf-8"?>
+<p:sld xmlns:a="http://schemas.openxmlformats.org/drawingml/2006/main" xmlns:r="http://schemas.openxmlformats.org/officeDocument/2006/relationships" xmlns:p="http://schemas.openxmlformats.org/presentationml/2006/main">
+  <p:cSld>
+    <p:spTree>
+      <p:nvGrpSpPr>
+        <p:cNvPr id="1" name="">
+          <a:extLst>
+            <a:ext uri="{FF2B5EF4-FFF2-40B4-BE49-F238E27FC236}">
+              <a16:creationId xmlns:a16="http://schemas.microsoft.com/office/drawing/2014/main" id="{5D17264F-B61F-991E-CEDA-D84D8205B3E5}"/>
+            </a:ext>
+          </a:extLst>
+        </p:cNvPr>
+        <p:cNvGrpSpPr/>
+        <p:nvPr/>
+      </p:nvGrpSpPr>
+      <p:grpSpPr>
+        <a:xfrm>
+          <a:off x="0" y="0"/>
+          <a:ext cx="0" cy="0"/>
+          <a:chOff x="0" y="0"/>
+          <a:chExt cx="0" cy="0"/>
+        </a:xfrm>
+      </p:grpSpPr>
+      <p:sp>
+        <p:nvSpPr>
+          <p:cNvPr id="2" name="Title 1">
+            <a:extLst>
+              <a:ext uri="{FF2B5EF4-FFF2-40B4-BE49-F238E27FC236}">
+                <a16:creationId xmlns:a16="http://schemas.microsoft.com/office/drawing/2014/main" id="{4BDE29AE-FE00-5280-D444-C6136E729B4A}"/>
+              </a:ext>
+            </a:extLst>
+          </p:cNvPr>
+          <p:cNvSpPr>
+            <a:spLocks noGrp="1"/>
+          </p:cNvSpPr>
+          <p:nvPr>
+            <p:ph type="title"/>
+          </p:nvPr>
+        </p:nvSpPr>
+        <p:spPr/>
+        <p:txBody>
+          <a:bodyPr/>
+          <a:lstStyle/>
+          <a:p>
+            <a:r>
+              <a:rPr lang="en-US" b="1" dirty="0"/>
+              <a:t>6. Detailed Design</a:t>
+            </a:r>
+          </a:p>
+        </p:txBody>
+      </p:sp>
+      <p:sp>
+        <p:nvSpPr>
+          <p:cNvPr id="3" name="Table Placeholder 2">
+            <a:extLst>
+              <a:ext uri="{FF2B5EF4-FFF2-40B4-BE49-F238E27FC236}">
+                <a16:creationId xmlns:a16="http://schemas.microsoft.com/office/drawing/2014/main" id="{E1945519-2EFC-E32E-B056-5E37ECA14A58}"/>
+              </a:ext>
+            </a:extLst>
+          </p:cNvPr>
+          <p:cNvSpPr>
+            <a:spLocks noGrp="1"/>
+          </p:cNvSpPr>
+          <p:nvPr>
+            <p:ph type="tbl" sz="quarter" idx="10"/>
+          </p:nvPr>
+        </p:nvSpPr>
+        <p:spPr/>
+        <p:txBody>
+          <a:bodyPr/>
+          <a:lstStyle/>
+          <a:p>
+            <a:pPr marL="457200" indent="-457200">
+              <a:buFont typeface="+mj-lt"/>
+              <a:buAutoNum type="arabicPeriod" startAt="3"/>
+            </a:pPr>
+            <a:endParaRPr lang="en-US" b="1" dirty="0"/>
+          </a:p>
+          <a:p>
+            <a:pPr marL="457200" indent="-457200">
+              <a:buFont typeface="+mj-lt"/>
+              <a:buAutoNum type="arabicPeriod" startAt="3"/>
+            </a:pPr>
+            <a:endParaRPr lang="en-US" b="1" dirty="0"/>
+          </a:p>
+          <a:p>
+            <a:pPr marL="457200" indent="-457200">
+              <a:buFont typeface="+mj-lt"/>
+              <a:buAutoNum type="arabicPeriod" startAt="3"/>
+            </a:pPr>
+            <a:r>
+              <a:rPr lang="en-US" b="1" dirty="0"/>
+              <a:t>TRADE ORDER SERVICE</a:t>
+            </a:r>
+          </a:p>
+        </p:txBody>
+      </p:sp>
+      <p:sp>
+        <p:nvSpPr>
+          <p:cNvPr id="4" name="Slide Number Placeholder 3">
+            <a:extLst>
+              <a:ext uri="{FF2B5EF4-FFF2-40B4-BE49-F238E27FC236}">
+                <a16:creationId xmlns:a16="http://schemas.microsoft.com/office/drawing/2014/main" id="{1FA9BCD1-F02C-2918-6F77-E7E235C391FF}"/>
+              </a:ext>
+            </a:extLst>
+          </p:cNvPr>
+          <p:cNvSpPr>
+            <a:spLocks noGrp="1"/>
+          </p:cNvSpPr>
+          <p:nvPr>
+            <p:ph type="sldNum" sz="quarter" idx="4"/>
+          </p:nvPr>
+        </p:nvSpPr>
+        <p:spPr/>
+        <p:txBody>
+          <a:bodyPr/>
+          <a:lstStyle/>
+          <a:p>
+            <a:fld id="{B5CEABB6-07DC-46E8-9B57-56EC44A396E5}" type="slidenum">
+              <a:rPr lang="en-US" smtClean="0"/>
+              <a:pPr/>
+              <a:t>20</a:t>
+            </a:fld>
+            <a:endParaRPr lang="en-US" dirty="0"/>
+          </a:p>
+        </p:txBody>
+      </p:sp>
+      <p:pic>
+        <p:nvPicPr>
+          <p:cNvPr id="4100" name="Picture 4">
+            <a:extLst>
+              <a:ext uri="{FF2B5EF4-FFF2-40B4-BE49-F238E27FC236}">
+                <a16:creationId xmlns:a16="http://schemas.microsoft.com/office/drawing/2014/main" id="{61467C40-C3BC-0841-CEDC-1BE5C03A3B49}"/>
+              </a:ext>
+            </a:extLst>
+          </p:cNvPr>
+          <p:cNvPicPr>
+            <a:picLocks noChangeAspect="1" noChangeArrowheads="1"/>
+          </p:cNvPicPr>
+          <p:nvPr/>
+        </p:nvPicPr>
+        <p:blipFill>
+          <a:blip r:embed="rId2">
+            <a:extLst>
+              <a:ext uri="{28A0092B-C50C-407E-A947-70E740481C1C}">
+                <a14:useLocalDpi xmlns:a14="http://schemas.microsoft.com/office/drawing/2010/main" val="0"/>
+              </a:ext>
+            </a:extLst>
+          </a:blip>
+          <a:srcRect/>
+          <a:stretch>
+            <a:fillRect/>
+          </a:stretch>
+        </p:blipFill>
+        <p:spPr bwMode="auto">
+          <a:xfrm>
+            <a:off x="4133279" y="1189359"/>
+            <a:ext cx="7381875" cy="5353050"/>
+          </a:xfrm>
+          <a:prstGeom prst="rect">
+            <a:avLst/>
+          </a:prstGeom>
+          <a:noFill/>
+          <a:extLst>
+            <a:ext uri="{909E8E84-426E-40DD-AFC4-6F175D3DCCD1}">
+              <a14:hiddenFill xmlns:a14="http://schemas.microsoft.com/office/drawing/2010/main">
+                <a:solidFill>
+                  <a:srgbClr val="FFFFFF"/>
+                </a:solidFill>
+              </a14:hiddenFill>
+            </a:ext>
+          </a:extLst>
+        </p:spPr>
+      </p:pic>
+    </p:spTree>
+    <p:extLst>
+      <p:ext uri="{BB962C8B-B14F-4D97-AF65-F5344CB8AC3E}">
+        <p14:creationId xmlns:p14="http://schemas.microsoft.com/office/powerpoint/2010/main" val="2085276075"/>
+      </p:ext>
+    </p:extLst>
+  </p:cSld>
+  <p:clrMapOvr>
+    <a:masterClrMapping/>
+  </p:clrMapOvr>
+</p:sld>
+</file>
+
+<file path=ppt/slides/slide21.xml><?xml version="1.0" encoding="utf-8"?>
+<p:sld xmlns:a="http://schemas.openxmlformats.org/drawingml/2006/main" xmlns:r="http://schemas.openxmlformats.org/officeDocument/2006/relationships" xmlns:p="http://schemas.openxmlformats.org/presentationml/2006/main">
+  <p:cSld>
+    <p:spTree>
+      <p:nvGrpSpPr>
+        <p:cNvPr id="1" name="">
+          <a:extLst>
+            <a:ext uri="{FF2B5EF4-FFF2-40B4-BE49-F238E27FC236}">
+              <a16:creationId xmlns:a16="http://schemas.microsoft.com/office/drawing/2014/main" id="{66367792-D6CE-0885-A6FA-101739F774E1}"/>
+            </a:ext>
+          </a:extLst>
+        </p:cNvPr>
+        <p:cNvGrpSpPr/>
+        <p:nvPr/>
+      </p:nvGrpSpPr>
+      <p:grpSpPr>
+        <a:xfrm>
+          <a:off x="0" y="0"/>
+          <a:ext cx="0" cy="0"/>
+          <a:chOff x="0" y="0"/>
+          <a:chExt cx="0" cy="0"/>
+        </a:xfrm>
+      </p:grpSpPr>
+      <p:sp>
+        <p:nvSpPr>
+          <p:cNvPr id="2" name="Title 1">
+            <a:extLst>
+              <a:ext uri="{FF2B5EF4-FFF2-40B4-BE49-F238E27FC236}">
+                <a16:creationId xmlns:a16="http://schemas.microsoft.com/office/drawing/2014/main" id="{2D90199A-896E-13AD-01E0-6214D96F2A6E}"/>
+              </a:ext>
+            </a:extLst>
+          </p:cNvPr>
+          <p:cNvSpPr>
+            <a:spLocks noGrp="1"/>
+          </p:cNvSpPr>
+          <p:nvPr>
+            <p:ph type="title"/>
+          </p:nvPr>
+        </p:nvSpPr>
+        <p:spPr/>
+        <p:txBody>
+          <a:bodyPr/>
+          <a:lstStyle/>
+          <a:p>
+            <a:r>
+              <a:rPr lang="en-US" b="1" dirty="0"/>
+              <a:t>7. Identifying &amp; Resolving Bottlenecks</a:t>
+            </a:r>
+          </a:p>
+        </p:txBody>
+      </p:sp>
+      <p:sp>
+        <p:nvSpPr>
+          <p:cNvPr id="3" name="Table Placeholder 2">
+            <a:extLst>
+              <a:ext uri="{FF2B5EF4-FFF2-40B4-BE49-F238E27FC236}">
+                <a16:creationId xmlns:a16="http://schemas.microsoft.com/office/drawing/2014/main" id="{B7F795F9-5FE8-A681-0D90-CE62B1159092}"/>
+              </a:ext>
+            </a:extLst>
+          </p:cNvPr>
+          <p:cNvSpPr>
+            <a:spLocks noGrp="1"/>
+          </p:cNvSpPr>
+          <p:nvPr>
+            <p:ph type="tbl" sz="quarter" idx="10"/>
+          </p:nvPr>
+        </p:nvSpPr>
+        <p:spPr/>
+        <p:txBody>
+          <a:bodyPr/>
+          <a:lstStyle/>
+          <a:p>
+            <a:endParaRPr lang="en-US"/>
+          </a:p>
+        </p:txBody>
+      </p:sp>
+      <p:sp>
+        <p:nvSpPr>
+          <p:cNvPr id="4" name="Slide Number Placeholder 3">
+            <a:extLst>
+              <a:ext uri="{FF2B5EF4-FFF2-40B4-BE49-F238E27FC236}">
+                <a16:creationId xmlns:a16="http://schemas.microsoft.com/office/drawing/2014/main" id="{21DD60F2-91DC-B665-749E-7683E2211724}"/>
+              </a:ext>
+            </a:extLst>
+          </p:cNvPr>
+          <p:cNvSpPr>
+            <a:spLocks noGrp="1"/>
+          </p:cNvSpPr>
+          <p:nvPr>
+            <p:ph type="sldNum" sz="quarter" idx="4"/>
+          </p:nvPr>
+        </p:nvSpPr>
+        <p:spPr/>
+        <p:txBody>
+          <a:bodyPr/>
+          <a:lstStyle/>
+          <a:p>
+            <a:fld id="{B5CEABB6-07DC-46E8-9B57-56EC44A396E5}" type="slidenum">
+              <a:rPr lang="en-US" smtClean="0"/>
+              <a:pPr/>
+              <a:t>21</a:t>
+            </a:fld>
+            <a:endParaRPr lang="en-US" dirty="0"/>
+          </a:p>
+        </p:txBody>
+      </p:sp>
+    </p:spTree>
+    <p:extLst>
+      <p:ext uri="{BB962C8B-B14F-4D97-AF65-F5344CB8AC3E}">
+        <p14:creationId xmlns:p14="http://schemas.microsoft.com/office/powerpoint/2010/main" val="3135018115"/>
+      </p:ext>
+    </p:extLst>
+  </p:cSld>
+  <p:clrMapOvr>
+    <a:masterClrMapping/>
+  </p:clrMapOvr>
+</p:sld>
+</file>
+
+<file path=ppt/slides/slide22.xml><?xml version="1.0" encoding="utf-8"?>
+<p:sld xmlns:a="http://schemas.openxmlformats.org/drawingml/2006/main" xmlns:r="http://schemas.openxmlformats.org/officeDocument/2006/relationships" xmlns:p="http://schemas.openxmlformats.org/presentationml/2006/main">
+  <p:cSld>
+    <p:bg>
+      <p:bgPr>
+        <a:solidFill>
+          <a:schemeClr val="tx1"/>
+        </a:solidFill>
+        <a:effectLst/>
+      </p:bgPr>
+    </p:bg>
+    <p:spTree>
+      <p:nvGrpSpPr>
+        <p:cNvPr id="1" name=""/>
+        <p:cNvGrpSpPr/>
+        <p:nvPr/>
+      </p:nvGrpSpPr>
+      <p:grpSpPr>
+        <a:xfrm>
+          <a:off x="0" y="0"/>
+          <a:ext cx="0" cy="0"/>
+          <a:chOff x="0" y="0"/>
+          <a:chExt cx="0" cy="0"/>
+        </a:xfrm>
+      </p:grpSpPr>
+      <p:pic>
+        <p:nvPicPr>
+          <p:cNvPr id="3" name="Graphic 2">
+            <a:extLst>
+              <a:ext uri="{FF2B5EF4-FFF2-40B4-BE49-F238E27FC236}">
+                <a16:creationId xmlns:a16="http://schemas.microsoft.com/office/drawing/2014/main" id="{77B52831-0916-294C-0ACB-9774B9805D9B}"/>
+              </a:ext>
+              <a:ext uri="{C183D7F6-B498-43B3-948B-1728B52AA6E4}">
+                <adec:decorative xmlns:adec="http://schemas.microsoft.com/office/drawing/2017/decorative" val="1"/>
+              </a:ext>
+            </a:extLst>
+          </p:cNvPr>
+          <p:cNvPicPr>
+            <a:picLocks noChangeAspect="1"/>
+          </p:cNvPicPr>
+          <p:nvPr/>
+        </p:nvPicPr>
+        <p:blipFill rotWithShape="1">
+          <a:blip r:embed="rId3">
+            <a:extLst>
+              <a:ext uri="{96DAC541-7B7A-43D3-8B79-37D633B846F1}">
+                <asvg:svgBlip xmlns:asvg="http://schemas.microsoft.com/office/drawing/2016/SVG/main" r:embed="rId4"/>
+              </a:ext>
+            </a:extLst>
+          </a:blip>
+          <a:srcRect l="4151" r="18577"/>
+          <a:stretch/>
+        </p:blipFill>
+        <p:spPr>
+          <a:xfrm flipH="1">
+            <a:off x="0" y="0"/>
+            <a:ext cx="5181600" cy="6858000"/>
+          </a:xfrm>
+          <a:prstGeom prst="rect">
+            <a:avLst/>
+          </a:prstGeom>
+        </p:spPr>
+      </p:pic>
+      <p:sp>
+        <p:nvSpPr>
+          <p:cNvPr id="7" name="Title 6">
+            <a:extLst>
+              <a:ext uri="{FF2B5EF4-FFF2-40B4-BE49-F238E27FC236}">
+                <a16:creationId xmlns:a16="http://schemas.microsoft.com/office/drawing/2014/main" id="{E82E216E-9EE0-9D3F-D692-083F575A3D04}"/>
+              </a:ext>
+            </a:extLst>
+          </p:cNvPr>
+          <p:cNvSpPr>
+            <a:spLocks noGrp="1"/>
+          </p:cNvSpPr>
+          <p:nvPr>
+            <p:ph type="title"/>
+          </p:nvPr>
+        </p:nvSpPr>
+        <p:spPr>
+          <a:xfrm>
+            <a:off x="6091515" y="374090"/>
+            <a:ext cx="5057104" cy="3624984"/>
+          </a:xfrm>
+        </p:spPr>
+        <p:txBody>
+          <a:bodyPr/>
+          <a:lstStyle/>
+          <a:p>
+            <a:r>
+              <a:rPr lang="en-US" dirty="0"/>
+              <a:t>Thank you</a:t>
+            </a:r>
+          </a:p>
+        </p:txBody>
+      </p:sp>
+      <p:sp>
+        <p:nvSpPr>
+          <p:cNvPr id="10" name="Content Placeholder 9">
+            <a:extLst>
+              <a:ext uri="{FF2B5EF4-FFF2-40B4-BE49-F238E27FC236}">
+                <a16:creationId xmlns:a16="http://schemas.microsoft.com/office/drawing/2014/main" id="{1F398FDD-E639-CF6A-B875-443655F2B31B}"/>
+              </a:ext>
+            </a:extLst>
+          </p:cNvPr>
+          <p:cNvSpPr>
+            <a:spLocks noGrp="1"/>
+          </p:cNvSpPr>
+          <p:nvPr>
+            <p:ph idx="1"/>
+          </p:nvPr>
+        </p:nvSpPr>
+        <p:spPr>
+          <a:xfrm>
+            <a:off x="6091514" y="4172989"/>
+            <a:ext cx="5057103" cy="2519363"/>
+          </a:xfrm>
+        </p:spPr>
+        <p:txBody>
+          <a:bodyPr/>
+          <a:lstStyle/>
+          <a:p>
+            <a:r>
+              <a:rPr lang="en-US" dirty="0"/>
+              <a:t>Thanh Nguyen</a:t>
+            </a:r>
+          </a:p>
+          <a:p>
+            <a:r>
+              <a:rPr lang="en-US" dirty="0" err="1"/>
+              <a:t>ndthanh2605@gmail.com</a:t>
+            </a:r>
+            <a:endParaRPr lang="en-US" dirty="0"/>
+          </a:p>
+        </p:txBody>
+      </p:sp>
+    </p:spTree>
+    <p:extLst>
+      <p:ext uri="{BB962C8B-B14F-4D97-AF65-F5344CB8AC3E}">
+        <p14:creationId xmlns:p14="http://schemas.microsoft.com/office/powerpoint/2010/main" val="769932640"/>
       </p:ext>
     </p:extLst>
   </p:cSld>

</xml_diff>

<commit_message>
Update System Design (final)
</commit_message>
<xml_diff>
--- a/System Design/Real-Time Order Book Aggregation and Optimal Trade Execution.pptx
+++ b/System Design/Real-Time Order Book Aggregation and Optimal Trade Execution.pptx
@@ -5,10 +5,10 @@
     <p:sldMasterId id="2147483666" r:id="rId4"/>
   </p:sldMasterIdLst>
   <p:notesMasterIdLst>
-    <p:notesMasterId r:id="rId27"/>
+    <p:notesMasterId r:id="rId30"/>
   </p:notesMasterIdLst>
   <p:handoutMasterIdLst>
-    <p:handoutMasterId r:id="rId28"/>
+    <p:handoutMasterId r:id="rId31"/>
   </p:handoutMasterIdLst>
   <p:sldIdLst>
     <p:sldId id="314" r:id="rId5"/>
@@ -26,13 +26,16 @@
     <p:sldId id="331" r:id="rId17"/>
     <p:sldId id="340" r:id="rId18"/>
     <p:sldId id="333" r:id="rId19"/>
-    <p:sldId id="341" r:id="rId20"/>
-    <p:sldId id="342" r:id="rId21"/>
-    <p:sldId id="343" r:id="rId22"/>
-    <p:sldId id="344" r:id="rId23"/>
-    <p:sldId id="345" r:id="rId24"/>
-    <p:sldId id="332" r:id="rId25"/>
-    <p:sldId id="309" r:id="rId26"/>
+    <p:sldId id="346" r:id="rId20"/>
+    <p:sldId id="341" r:id="rId21"/>
+    <p:sldId id="342" r:id="rId22"/>
+    <p:sldId id="347" r:id="rId23"/>
+    <p:sldId id="343" r:id="rId24"/>
+    <p:sldId id="344" r:id="rId25"/>
+    <p:sldId id="348" r:id="rId26"/>
+    <p:sldId id="345" r:id="rId27"/>
+    <p:sldId id="332" r:id="rId28"/>
+    <p:sldId id="309" r:id="rId29"/>
   </p:sldIdLst>
   <p:sldSz cx="12192000" cy="6858000"/>
   <p:notesSz cx="6858000" cy="9144000"/>
@@ -936,7 +939,7 @@
           <a:p>
             <a:fld id="{D4B9A9E5-4F7F-4A7D-9DE1-899232329269}" type="slidenum">
               <a:rPr lang="en-US" smtClean="0"/>
-              <a:t>22</a:t>
+              <a:t>25</a:t>
             </a:fld>
             <a:endParaRPr lang="en-US" dirty="0"/>
           </a:p>
@@ -14965,6 +14968,182 @@
         <p:cNvPr id="1" name="">
           <a:extLst>
             <a:ext uri="{FF2B5EF4-FFF2-40B4-BE49-F238E27FC236}">
+              <a16:creationId xmlns:a16="http://schemas.microsoft.com/office/drawing/2014/main" id="{79CDA164-8513-FB6C-1237-8EEB2BD57C98}"/>
+            </a:ext>
+          </a:extLst>
+        </p:cNvPr>
+        <p:cNvGrpSpPr/>
+        <p:nvPr/>
+      </p:nvGrpSpPr>
+      <p:grpSpPr>
+        <a:xfrm>
+          <a:off x="0" y="0"/>
+          <a:ext cx="0" cy="0"/>
+          <a:chOff x="0" y="0"/>
+          <a:chExt cx="0" cy="0"/>
+        </a:xfrm>
+      </p:grpSpPr>
+      <p:sp>
+        <p:nvSpPr>
+          <p:cNvPr id="2" name="Title 1">
+            <a:extLst>
+              <a:ext uri="{FF2B5EF4-FFF2-40B4-BE49-F238E27FC236}">
+                <a16:creationId xmlns:a16="http://schemas.microsoft.com/office/drawing/2014/main" id="{17EC5001-6BDE-7CCD-DCDA-C0AE68E4D388}"/>
+              </a:ext>
+            </a:extLst>
+          </p:cNvPr>
+          <p:cNvSpPr>
+            <a:spLocks noGrp="1"/>
+          </p:cNvSpPr>
+          <p:nvPr>
+            <p:ph type="title"/>
+          </p:nvPr>
+        </p:nvSpPr>
+        <p:spPr/>
+        <p:txBody>
+          <a:bodyPr/>
+          <a:lstStyle/>
+          <a:p>
+            <a:r>
+              <a:rPr lang="en-US" b="1" dirty="0"/>
+              <a:t>6. Detailed Design</a:t>
+            </a:r>
+          </a:p>
+        </p:txBody>
+      </p:sp>
+      <p:sp>
+        <p:nvSpPr>
+          <p:cNvPr id="3" name="Table Placeholder 2">
+            <a:extLst>
+              <a:ext uri="{FF2B5EF4-FFF2-40B4-BE49-F238E27FC236}">
+                <a16:creationId xmlns:a16="http://schemas.microsoft.com/office/drawing/2014/main" id="{17CB2B63-711E-6EE6-E314-16E75AC2FE80}"/>
+              </a:ext>
+            </a:extLst>
+          </p:cNvPr>
+          <p:cNvSpPr>
+            <a:spLocks noGrp="1"/>
+          </p:cNvSpPr>
+          <p:nvPr>
+            <p:ph type="tbl" sz="quarter" idx="10"/>
+          </p:nvPr>
+        </p:nvSpPr>
+        <p:spPr/>
+        <p:txBody>
+          <a:bodyPr/>
+          <a:lstStyle/>
+          <a:p>
+            <a:pPr marL="457200" indent="-457200">
+              <a:buFont typeface="+mj-lt"/>
+              <a:buAutoNum type="arabicPeriod"/>
+            </a:pPr>
+            <a:r>
+              <a:rPr lang="en-US" b="1" dirty="0"/>
+              <a:t>DATA AGGREGATION SERVICE</a:t>
+            </a:r>
+          </a:p>
+          <a:p>
+            <a:pPr lvl="1"/>
+            <a:r>
+              <a:rPr lang="en-US" dirty="0"/>
+              <a:t>Modules</a:t>
+            </a:r>
+          </a:p>
+          <a:p>
+            <a:pPr lvl="2"/>
+            <a:r>
+              <a:rPr lang="en-US" dirty="0" err="1"/>
+              <a:t>Websocket</a:t>
+            </a:r>
+            <a:r>
+              <a:rPr lang="en-US" dirty="0"/>
+              <a:t> Connection Manager</a:t>
+            </a:r>
+          </a:p>
+          <a:p>
+            <a:pPr lvl="3"/>
+            <a:r>
+              <a:rPr lang="en-US" dirty="0"/>
+              <a:t>Can be replaced with different connection protocols</a:t>
+            </a:r>
+          </a:p>
+          <a:p>
+            <a:pPr lvl="2"/>
+            <a:r>
+              <a:rPr lang="en-US" dirty="0"/>
+              <a:t>Exchange Data Fetcher</a:t>
+            </a:r>
+          </a:p>
+          <a:p>
+            <a:pPr lvl="2"/>
+            <a:r>
+              <a:rPr lang="en-US" dirty="0"/>
+              <a:t>Orderbook Data Processor</a:t>
+            </a:r>
+          </a:p>
+          <a:p>
+            <a:pPr lvl="2"/>
+            <a:r>
+              <a:rPr lang="en-US" dirty="0"/>
+              <a:t>API Response Handler</a:t>
+            </a:r>
+          </a:p>
+          <a:p>
+            <a:pPr lvl="1"/>
+            <a:endParaRPr lang="en-US" dirty="0"/>
+          </a:p>
+        </p:txBody>
+      </p:sp>
+      <p:sp>
+        <p:nvSpPr>
+          <p:cNvPr id="4" name="Slide Number Placeholder 3">
+            <a:extLst>
+              <a:ext uri="{FF2B5EF4-FFF2-40B4-BE49-F238E27FC236}">
+                <a16:creationId xmlns:a16="http://schemas.microsoft.com/office/drawing/2014/main" id="{F5698D19-6A48-9735-C2F7-0F9BD7F930F1}"/>
+              </a:ext>
+            </a:extLst>
+          </p:cNvPr>
+          <p:cNvSpPr>
+            <a:spLocks noGrp="1"/>
+          </p:cNvSpPr>
+          <p:nvPr>
+            <p:ph type="sldNum" sz="quarter" idx="4"/>
+          </p:nvPr>
+        </p:nvSpPr>
+        <p:spPr/>
+        <p:txBody>
+          <a:bodyPr/>
+          <a:lstStyle/>
+          <a:p>
+            <a:fld id="{B5CEABB6-07DC-46E8-9B57-56EC44A396E5}" type="slidenum">
+              <a:rPr lang="en-US" smtClean="0"/>
+              <a:pPr/>
+              <a:t>16</a:t>
+            </a:fld>
+            <a:endParaRPr lang="en-US" dirty="0"/>
+          </a:p>
+        </p:txBody>
+      </p:sp>
+    </p:spTree>
+    <p:extLst>
+      <p:ext uri="{BB962C8B-B14F-4D97-AF65-F5344CB8AC3E}">
+        <p14:creationId xmlns:p14="http://schemas.microsoft.com/office/powerpoint/2010/main" val="2248566393"/>
+      </p:ext>
+    </p:extLst>
+  </p:cSld>
+  <p:clrMapOvr>
+    <a:masterClrMapping/>
+  </p:clrMapOvr>
+</p:sld>
+</file>
+
+<file path=ppt/slides/slide17.xml><?xml version="1.0" encoding="utf-8"?>
+<p:sld xmlns:a="http://schemas.openxmlformats.org/drawingml/2006/main" xmlns:r="http://schemas.openxmlformats.org/officeDocument/2006/relationships" xmlns:p="http://schemas.openxmlformats.org/presentationml/2006/main">
+  <p:cSld>
+    <p:spTree>
+      <p:nvGrpSpPr>
+        <p:cNvPr id="1" name="">
+          <a:extLst>
+            <a:ext uri="{FF2B5EF4-FFF2-40B4-BE49-F238E27FC236}">
               <a16:creationId xmlns:a16="http://schemas.microsoft.com/office/drawing/2014/main" id="{A17A39B9-B435-C25B-E01A-B6D8B6FF122C}"/>
             </a:ext>
           </a:extLst>
@@ -15064,7 +15243,7 @@
             <a:fld id="{B5CEABB6-07DC-46E8-9B57-56EC44A396E5}" type="slidenum">
               <a:rPr lang="en-US" smtClean="0"/>
               <a:pPr/>
-              <a:t>16</a:t>
+              <a:t>17</a:t>
             </a:fld>
             <a:endParaRPr lang="en-US" dirty="0"/>
           </a:p>
@@ -15130,7 +15309,7 @@
 </p:sld>
 </file>
 
-<file path=ppt/slides/slide17.xml><?xml version="1.0" encoding="utf-8"?>
+<file path=ppt/slides/slide18.xml><?xml version="1.0" encoding="utf-8"?>
 <p:sld xmlns:a="http://schemas.openxmlformats.org/drawingml/2006/main" xmlns:r="http://schemas.openxmlformats.org/officeDocument/2006/relationships" xmlns:p="http://schemas.openxmlformats.org/presentationml/2006/main">
   <p:cSld>
     <p:spTree>
@@ -15311,7 +15490,7 @@
             <a:fld id="{B5CEABB6-07DC-46E8-9B57-56EC44A396E5}" type="slidenum">
               <a:rPr lang="en-US" smtClean="0"/>
               <a:pPr/>
-              <a:t>17</a:t>
+              <a:t>18</a:t>
             </a:fld>
             <a:endParaRPr lang="en-US" dirty="0"/>
           </a:p>
@@ -15330,7 +15509,367 @@
 </p:sld>
 </file>
 
-<file path=ppt/slides/slide18.xml><?xml version="1.0" encoding="utf-8"?>
+<file path=ppt/slides/slide19.xml><?xml version="1.0" encoding="utf-8"?>
+<p:sld xmlns:a="http://schemas.openxmlformats.org/drawingml/2006/main" xmlns:r="http://schemas.openxmlformats.org/officeDocument/2006/relationships" xmlns:p="http://schemas.openxmlformats.org/presentationml/2006/main">
+  <p:cSld>
+    <p:spTree>
+      <p:nvGrpSpPr>
+        <p:cNvPr id="1" name="">
+          <a:extLst>
+            <a:ext uri="{FF2B5EF4-FFF2-40B4-BE49-F238E27FC236}">
+              <a16:creationId xmlns:a16="http://schemas.microsoft.com/office/drawing/2014/main" id="{C3C37101-FD6B-59EE-C5B2-72C485D30B2D}"/>
+            </a:ext>
+          </a:extLst>
+        </p:cNvPr>
+        <p:cNvGrpSpPr/>
+        <p:nvPr/>
+      </p:nvGrpSpPr>
+      <p:grpSpPr>
+        <a:xfrm>
+          <a:off x="0" y="0"/>
+          <a:ext cx="0" cy="0"/>
+          <a:chOff x="0" y="0"/>
+          <a:chExt cx="0" cy="0"/>
+        </a:xfrm>
+      </p:grpSpPr>
+      <p:sp>
+        <p:nvSpPr>
+          <p:cNvPr id="2" name="Title 1">
+            <a:extLst>
+              <a:ext uri="{FF2B5EF4-FFF2-40B4-BE49-F238E27FC236}">
+                <a16:creationId xmlns:a16="http://schemas.microsoft.com/office/drawing/2014/main" id="{09B0AD99-31F0-7510-9591-00BDBCEBD16F}"/>
+              </a:ext>
+            </a:extLst>
+          </p:cNvPr>
+          <p:cNvSpPr>
+            <a:spLocks noGrp="1"/>
+          </p:cNvSpPr>
+          <p:nvPr>
+            <p:ph type="title"/>
+          </p:nvPr>
+        </p:nvSpPr>
+        <p:spPr/>
+        <p:txBody>
+          <a:bodyPr/>
+          <a:lstStyle/>
+          <a:p>
+            <a:r>
+              <a:rPr lang="en-US" b="1" dirty="0"/>
+              <a:t>6. Detailed Design</a:t>
+            </a:r>
+          </a:p>
+        </p:txBody>
+      </p:sp>
+      <p:sp>
+        <p:nvSpPr>
+          <p:cNvPr id="3" name="Table Placeholder 2">
+            <a:extLst>
+              <a:ext uri="{FF2B5EF4-FFF2-40B4-BE49-F238E27FC236}">
+                <a16:creationId xmlns:a16="http://schemas.microsoft.com/office/drawing/2014/main" id="{8F097190-EB00-6333-15FC-199574BF4261}"/>
+              </a:ext>
+            </a:extLst>
+          </p:cNvPr>
+          <p:cNvSpPr>
+            <a:spLocks noGrp="1"/>
+          </p:cNvSpPr>
+          <p:nvPr>
+            <p:ph type="tbl" sz="quarter" idx="10"/>
+          </p:nvPr>
+        </p:nvSpPr>
+        <p:spPr/>
+        <p:txBody>
+          <a:bodyPr/>
+          <a:lstStyle/>
+          <a:p>
+            <a:pPr marL="457200" indent="-457200">
+              <a:buFont typeface="+mj-lt"/>
+              <a:buAutoNum type="arabicPeriod" startAt="2"/>
+            </a:pPr>
+            <a:r>
+              <a:rPr lang="en-US" b="1" dirty="0"/>
+              <a:t>OPTIMAL TRADE SERVICE</a:t>
+            </a:r>
+          </a:p>
+          <a:p>
+            <a:pPr lvl="1"/>
+            <a:r>
+              <a:rPr lang="en-US" dirty="0"/>
+              <a:t>Modules</a:t>
+            </a:r>
+          </a:p>
+          <a:p>
+            <a:pPr lvl="2"/>
+            <a:r>
+              <a:rPr lang="en-US" dirty="0"/>
+              <a:t>API Response Handler</a:t>
+            </a:r>
+          </a:p>
+          <a:p>
+            <a:pPr lvl="2"/>
+            <a:r>
+              <a:rPr lang="en-US" dirty="0"/>
+              <a:t>Trade Graph Builder</a:t>
+            </a:r>
+          </a:p>
+          <a:p>
+            <a:pPr lvl="2"/>
+            <a:r>
+              <a:rPr lang="en-US" dirty="0"/>
+              <a:t>Path Finding Engine</a:t>
+            </a:r>
+          </a:p>
+          <a:p>
+            <a:pPr lvl="2"/>
+            <a:r>
+              <a:rPr lang="en-US" dirty="0"/>
+              <a:t>Trade Data Manager</a:t>
+            </a:r>
+          </a:p>
+        </p:txBody>
+      </p:sp>
+      <p:sp>
+        <p:nvSpPr>
+          <p:cNvPr id="4" name="Slide Number Placeholder 3">
+            <a:extLst>
+              <a:ext uri="{FF2B5EF4-FFF2-40B4-BE49-F238E27FC236}">
+                <a16:creationId xmlns:a16="http://schemas.microsoft.com/office/drawing/2014/main" id="{CFB10F05-AD31-BA9B-41FE-E7E99EBB884E}"/>
+              </a:ext>
+            </a:extLst>
+          </p:cNvPr>
+          <p:cNvSpPr>
+            <a:spLocks noGrp="1"/>
+          </p:cNvSpPr>
+          <p:nvPr>
+            <p:ph type="sldNum" sz="quarter" idx="4"/>
+          </p:nvPr>
+        </p:nvSpPr>
+        <p:spPr/>
+        <p:txBody>
+          <a:bodyPr/>
+          <a:lstStyle/>
+          <a:p>
+            <a:fld id="{B5CEABB6-07DC-46E8-9B57-56EC44A396E5}" type="slidenum">
+              <a:rPr lang="en-US" smtClean="0"/>
+              <a:pPr/>
+              <a:t>19</a:t>
+            </a:fld>
+            <a:endParaRPr lang="en-US" dirty="0"/>
+          </a:p>
+        </p:txBody>
+      </p:sp>
+    </p:spTree>
+    <p:extLst>
+      <p:ext uri="{BB962C8B-B14F-4D97-AF65-F5344CB8AC3E}">
+        <p14:creationId xmlns:p14="http://schemas.microsoft.com/office/powerpoint/2010/main" val="354999714"/>
+      </p:ext>
+    </p:extLst>
+  </p:cSld>
+  <p:clrMapOvr>
+    <a:masterClrMapping/>
+  </p:clrMapOvr>
+</p:sld>
+</file>
+
+<file path=ppt/slides/slide2.xml><?xml version="1.0" encoding="utf-8"?>
+<p:sld xmlns:a="http://schemas.openxmlformats.org/drawingml/2006/main" xmlns:r="http://schemas.openxmlformats.org/officeDocument/2006/relationships" xmlns:p="http://schemas.openxmlformats.org/presentationml/2006/main">
+  <p:cSld>
+    <p:spTree>
+      <p:nvGrpSpPr>
+        <p:cNvPr id="1" name=""/>
+        <p:cNvGrpSpPr/>
+        <p:nvPr/>
+      </p:nvGrpSpPr>
+      <p:grpSpPr>
+        <a:xfrm>
+          <a:off x="0" y="0"/>
+          <a:ext cx="0" cy="0"/>
+          <a:chOff x="0" y="0"/>
+          <a:chExt cx="0" cy="0"/>
+        </a:xfrm>
+      </p:grpSpPr>
+      <p:sp>
+        <p:nvSpPr>
+          <p:cNvPr id="2" name="Title 1">
+            <a:extLst>
+              <a:ext uri="{FF2B5EF4-FFF2-40B4-BE49-F238E27FC236}">
+                <a16:creationId xmlns:a16="http://schemas.microsoft.com/office/drawing/2014/main" id="{1BEF5859-10C9-4588-9727-B9362E26C29D}"/>
+              </a:ext>
+            </a:extLst>
+          </p:cNvPr>
+          <p:cNvSpPr>
+            <a:spLocks noGrp="1"/>
+          </p:cNvSpPr>
+          <p:nvPr>
+            <p:ph type="title"/>
+          </p:nvPr>
+        </p:nvSpPr>
+        <p:spPr>
+          <a:xfrm>
+            <a:off x="666974" y="501651"/>
+            <a:ext cx="3861994" cy="1025935"/>
+          </a:xfrm>
+        </p:spPr>
+        <p:txBody>
+          <a:bodyPr>
+            <a:normAutofit fontScale="90000"/>
+          </a:bodyPr>
+          <a:lstStyle/>
+          <a:p>
+            <a:r>
+              <a:rPr lang="en-US" sz="4000" b="1" dirty="0"/>
+              <a:t>System Design</a:t>
+            </a:r>
+          </a:p>
+        </p:txBody>
+      </p:sp>
+      <p:sp>
+        <p:nvSpPr>
+          <p:cNvPr id="3" name="Content Placeholder 2">
+            <a:extLst>
+              <a:ext uri="{FF2B5EF4-FFF2-40B4-BE49-F238E27FC236}">
+                <a16:creationId xmlns:a16="http://schemas.microsoft.com/office/drawing/2014/main" id="{5671D7E5-EF66-4BCD-8DAA-E9061157F0BE}"/>
+              </a:ext>
+            </a:extLst>
+          </p:cNvPr>
+          <p:cNvSpPr>
+            <a:spLocks noGrp="1"/>
+          </p:cNvSpPr>
+          <p:nvPr>
+            <p:ph idx="1"/>
+          </p:nvPr>
+        </p:nvSpPr>
+        <p:spPr>
+          <a:xfrm>
+            <a:off x="666973" y="1925619"/>
+            <a:ext cx="4797911" cy="4430730"/>
+          </a:xfrm>
+        </p:spPr>
+        <p:txBody>
+          <a:bodyPr>
+            <a:normAutofit/>
+          </a:bodyPr>
+          <a:lstStyle/>
+          <a:p>
+            <a:pPr marL="342900" indent="-342900">
+              <a:buFont typeface="+mj-lt"/>
+              <a:buAutoNum type="arabicPeriod"/>
+            </a:pPr>
+            <a:r>
+              <a:rPr lang="en-US" sz="2000" dirty="0"/>
+              <a:t>Requirement Clarification</a:t>
+            </a:r>
+          </a:p>
+          <a:p>
+            <a:pPr marL="342900" indent="-342900">
+              <a:buFont typeface="+mj-lt"/>
+              <a:buAutoNum type="arabicPeriod"/>
+            </a:pPr>
+            <a:r>
+              <a:rPr lang="en-US" sz="2000" dirty="0"/>
+              <a:t>Back-of-the-envelope Estimation</a:t>
+            </a:r>
+          </a:p>
+          <a:p>
+            <a:pPr marL="342900" indent="-342900">
+              <a:buFont typeface="+mj-lt"/>
+              <a:buAutoNum type="arabicPeriod"/>
+            </a:pPr>
+            <a:r>
+              <a:rPr lang="en-US" sz="2000" dirty="0"/>
+              <a:t>System Interface Definition</a:t>
+            </a:r>
+          </a:p>
+          <a:p>
+            <a:pPr marL="342900" indent="-342900">
+              <a:buFont typeface="+mj-lt"/>
+              <a:buAutoNum type="arabicPeriod"/>
+            </a:pPr>
+            <a:r>
+              <a:rPr lang="en-US" sz="2000" dirty="0"/>
+              <a:t>Data Model Definition</a:t>
+            </a:r>
+          </a:p>
+          <a:p>
+            <a:pPr marL="342900" indent="-342900">
+              <a:buFont typeface="+mj-lt"/>
+              <a:buAutoNum type="arabicPeriod"/>
+            </a:pPr>
+            <a:r>
+              <a:rPr lang="en-US" sz="2000" dirty="0"/>
+              <a:t>High Level Design</a:t>
+            </a:r>
+          </a:p>
+          <a:p>
+            <a:pPr marL="342900" indent="-342900">
+              <a:buFont typeface="+mj-lt"/>
+              <a:buAutoNum type="arabicPeriod"/>
+            </a:pPr>
+            <a:r>
+              <a:rPr lang="en-US" sz="2000" dirty="0"/>
+              <a:t>Detailed Design</a:t>
+            </a:r>
+          </a:p>
+          <a:p>
+            <a:pPr marL="342900" indent="-342900">
+              <a:buFont typeface="+mj-lt"/>
+              <a:buAutoNum type="arabicPeriod"/>
+            </a:pPr>
+            <a:r>
+              <a:rPr lang="en-US" sz="2000" dirty="0"/>
+              <a:t>Identifying &amp; Resolving Bottlenecks</a:t>
+            </a:r>
+          </a:p>
+        </p:txBody>
+      </p:sp>
+      <p:sp>
+        <p:nvSpPr>
+          <p:cNvPr id="5" name="Slide Number Placeholder 5">
+            <a:extLst>
+              <a:ext uri="{FF2B5EF4-FFF2-40B4-BE49-F238E27FC236}">
+                <a16:creationId xmlns:a16="http://schemas.microsoft.com/office/drawing/2014/main" id="{B02A8827-B1A1-2D2F-D6DD-E886B886C43E}"/>
+              </a:ext>
+            </a:extLst>
+          </p:cNvPr>
+          <p:cNvSpPr>
+            <a:spLocks noGrp="1"/>
+          </p:cNvSpPr>
+          <p:nvPr>
+            <p:ph type="sldNum" sz="quarter" idx="12"/>
+          </p:nvPr>
+        </p:nvSpPr>
+        <p:spPr>
+          <a:xfrm>
+            <a:off x="10373350" y="6356349"/>
+            <a:ext cx="987552" cy="365125"/>
+          </a:xfrm>
+        </p:spPr>
+        <p:txBody>
+          <a:bodyPr/>
+          <a:lstStyle/>
+          <a:p>
+            <a:fld id="{A49DFD55-3C28-40EF-9E31-A92D2E4017FF}" type="slidenum">
+              <a:rPr lang="en-US" smtClean="0"/>
+              <a:pPr/>
+              <a:t>2</a:t>
+            </a:fld>
+            <a:endParaRPr lang="en-US" dirty="0"/>
+          </a:p>
+        </p:txBody>
+      </p:sp>
+    </p:spTree>
+    <p:extLst>
+      <p:ext uri="{BB962C8B-B14F-4D97-AF65-F5344CB8AC3E}">
+        <p14:creationId xmlns:p14="http://schemas.microsoft.com/office/powerpoint/2010/main" val="1713219598"/>
+      </p:ext>
+    </p:extLst>
+  </p:cSld>
+  <p:clrMapOvr>
+    <a:masterClrMapping/>
+  </p:clrMapOvr>
+</p:sld>
+</file>
+
+<file path=ppt/slides/slide20.xml><?xml version="1.0" encoding="utf-8"?>
 <p:sld xmlns:a="http://schemas.openxmlformats.org/drawingml/2006/main" xmlns:r="http://schemas.openxmlformats.org/officeDocument/2006/relationships" xmlns:p="http://schemas.openxmlformats.org/presentationml/2006/main">
   <p:cSld>
     <p:spTree>
@@ -15441,7 +15980,7 @@
             <a:fld id="{B5CEABB6-07DC-46E8-9B57-56EC44A396E5}" type="slidenum">
               <a:rPr lang="en-US" smtClean="0"/>
               <a:pPr/>
-              <a:t>18</a:t>
+              <a:t>20</a:t>
             </a:fld>
             <a:endParaRPr lang="en-US" dirty="0"/>
           </a:p>
@@ -15507,7 +16046,7 @@
 </p:sld>
 </file>
 
-<file path=ppt/slides/slide19.xml><?xml version="1.0" encoding="utf-8"?>
+<file path=ppt/slides/slide21.xml><?xml version="1.0" encoding="utf-8"?>
 <p:sld xmlns:a="http://schemas.openxmlformats.org/drawingml/2006/main" xmlns:r="http://schemas.openxmlformats.org/officeDocument/2006/relationships" xmlns:p="http://schemas.openxmlformats.org/presentationml/2006/main">
   <p:cSld>
     <p:spTree>
@@ -15671,7 +16210,7 @@
             <a:fld id="{B5CEABB6-07DC-46E8-9B57-56EC44A396E5}" type="slidenum">
               <a:rPr lang="en-US" smtClean="0"/>
               <a:pPr/>
-              <a:t>19</a:t>
+              <a:t>21</a:t>
             </a:fld>
             <a:endParaRPr lang="en-US" dirty="0"/>
           </a:p>
@@ -15690,12 +16229,18 @@
 </p:sld>
 </file>
 
-<file path=ppt/slides/slide2.xml><?xml version="1.0" encoding="utf-8"?>
+<file path=ppt/slides/slide22.xml><?xml version="1.0" encoding="utf-8"?>
 <p:sld xmlns:a="http://schemas.openxmlformats.org/drawingml/2006/main" xmlns:r="http://schemas.openxmlformats.org/officeDocument/2006/relationships" xmlns:p="http://schemas.openxmlformats.org/presentationml/2006/main">
   <p:cSld>
     <p:spTree>
       <p:nvGrpSpPr>
-        <p:cNvPr id="1" name=""/>
+        <p:cNvPr id="1" name="">
+          <a:extLst>
+            <a:ext uri="{FF2B5EF4-FFF2-40B4-BE49-F238E27FC236}">
+              <a16:creationId xmlns:a16="http://schemas.microsoft.com/office/drawing/2014/main" id="{A3CBB4F5-32E1-ED5A-ACC3-91D7D2CE1C39}"/>
+            </a:ext>
+          </a:extLst>
+        </p:cNvPr>
         <p:cNvGrpSpPr/>
         <p:nvPr/>
       </p:nvGrpSpPr>
@@ -15712,7 +16257,7 @@
           <p:cNvPr id="2" name="Title 1">
             <a:extLst>
               <a:ext uri="{FF2B5EF4-FFF2-40B4-BE49-F238E27FC236}">
-                <a16:creationId xmlns:a16="http://schemas.microsoft.com/office/drawing/2014/main" id="{1BEF5859-10C9-4588-9727-B9362E26C29D}"/>
+                <a16:creationId xmlns:a16="http://schemas.microsoft.com/office/drawing/2014/main" id="{7CBB24DE-A48F-9B2E-AFB4-BF6D8126A0FB}"/>
               </a:ext>
             </a:extLst>
           </p:cNvPr>
@@ -15723,31 +16268,24 @@
             <p:ph type="title"/>
           </p:nvPr>
         </p:nvSpPr>
-        <p:spPr>
-          <a:xfrm>
-            <a:off x="666974" y="501651"/>
-            <a:ext cx="3861994" cy="1025935"/>
-          </a:xfrm>
-        </p:spPr>
+        <p:spPr/>
         <p:txBody>
-          <a:bodyPr>
-            <a:normAutofit fontScale="90000"/>
-          </a:bodyPr>
+          <a:bodyPr/>
           <a:lstStyle/>
           <a:p>
             <a:r>
-              <a:rPr lang="en-US" sz="4000" b="1" dirty="0"/>
-              <a:t>System Design</a:t>
+              <a:rPr lang="en-US" b="1" dirty="0"/>
+              <a:t>6. Detailed Design</a:t>
             </a:r>
           </a:p>
         </p:txBody>
       </p:sp>
       <p:sp>
         <p:nvSpPr>
-          <p:cNvPr id="3" name="Content Placeholder 2">
+          <p:cNvPr id="3" name="Table Placeholder 2">
             <a:extLst>
               <a:ext uri="{FF2B5EF4-FFF2-40B4-BE49-F238E27FC236}">
-                <a16:creationId xmlns:a16="http://schemas.microsoft.com/office/drawing/2014/main" id="{5671D7E5-EF66-4BCD-8DAA-E9061157F0BE}"/>
+                <a16:creationId xmlns:a16="http://schemas.microsoft.com/office/drawing/2014/main" id="{9F0EF56C-494D-E574-F3C3-082768ACA9C3}"/>
               </a:ext>
             </a:extLst>
           </p:cNvPr>
@@ -15755,98 +16293,73 @@
             <a:spLocks noGrp="1"/>
           </p:cNvSpPr>
           <p:nvPr>
-            <p:ph idx="1"/>
+            <p:ph type="tbl" sz="quarter" idx="10"/>
           </p:nvPr>
         </p:nvSpPr>
-        <p:spPr>
-          <a:xfrm>
-            <a:off x="666973" y="1925619"/>
-            <a:ext cx="4797911" cy="4430730"/>
-          </a:xfrm>
-        </p:spPr>
+        <p:spPr/>
         <p:txBody>
-          <a:bodyPr>
-            <a:normAutofit/>
-          </a:bodyPr>
+          <a:bodyPr/>
           <a:lstStyle/>
           <a:p>
-            <a:pPr marL="342900" indent="-342900">
+            <a:pPr marL="457200" indent="-457200">
               <a:buFont typeface="+mj-lt"/>
-              <a:buAutoNum type="arabicPeriod"/>
+              <a:buAutoNum type="arabicPeriod" startAt="3"/>
             </a:pPr>
             <a:r>
-              <a:rPr lang="en-US" sz="2000" dirty="0"/>
-              <a:t>Requirement Clarification</a:t>
-            </a:r>
-          </a:p>
-          <a:p>
-            <a:pPr marL="342900" indent="-342900">
-              <a:buFont typeface="+mj-lt"/>
-              <a:buAutoNum type="arabicPeriod"/>
-            </a:pPr>
-            <a:r>
-              <a:rPr lang="en-US" sz="2000" dirty="0"/>
-              <a:t>Back-of-the-envelope Estimation</a:t>
-            </a:r>
-          </a:p>
-          <a:p>
-            <a:pPr marL="342900" indent="-342900">
-              <a:buFont typeface="+mj-lt"/>
-              <a:buAutoNum type="arabicPeriod"/>
-            </a:pPr>
-            <a:r>
-              <a:rPr lang="en-US" sz="2000" dirty="0"/>
-              <a:t>System Interface Definition</a:t>
-            </a:r>
-          </a:p>
-          <a:p>
-            <a:pPr marL="342900" indent="-342900">
-              <a:buFont typeface="+mj-lt"/>
-              <a:buAutoNum type="arabicPeriod"/>
-            </a:pPr>
-            <a:r>
-              <a:rPr lang="en-US" sz="2000" dirty="0"/>
-              <a:t>Data Model Definition</a:t>
-            </a:r>
-          </a:p>
-          <a:p>
-            <a:pPr marL="342900" indent="-342900">
-              <a:buFont typeface="+mj-lt"/>
-              <a:buAutoNum type="arabicPeriod"/>
-            </a:pPr>
-            <a:r>
-              <a:rPr lang="en-US" sz="2000" dirty="0"/>
-              <a:t>High Level Design</a:t>
-            </a:r>
-          </a:p>
-          <a:p>
-            <a:pPr marL="342900" indent="-342900">
-              <a:buFont typeface="+mj-lt"/>
-              <a:buAutoNum type="arabicPeriod"/>
-            </a:pPr>
-            <a:r>
-              <a:rPr lang="en-US" sz="2000" dirty="0"/>
-              <a:t>Detailed Design</a:t>
-            </a:r>
-          </a:p>
-          <a:p>
-            <a:pPr marL="342900" indent="-342900">
-              <a:buFont typeface="+mj-lt"/>
-              <a:buAutoNum type="arabicPeriod"/>
-            </a:pPr>
-            <a:r>
-              <a:rPr lang="en-US" sz="2000" dirty="0"/>
-              <a:t>Identifying &amp; Resolving Bottlenecks</a:t>
+              <a:rPr lang="en-US" b="1" dirty="0"/>
+              <a:t>TRADE ORDER SERVICE</a:t>
+            </a:r>
+          </a:p>
+          <a:p>
+            <a:pPr lvl="1"/>
+            <a:r>
+              <a:rPr lang="en-US" dirty="0"/>
+              <a:t>Modules</a:t>
+            </a:r>
+          </a:p>
+          <a:p>
+            <a:pPr lvl="2"/>
+            <a:r>
+              <a:rPr lang="en-US" dirty="0"/>
+              <a:t>API Response Handler</a:t>
+            </a:r>
+          </a:p>
+          <a:p>
+            <a:pPr lvl="2"/>
+            <a:r>
+              <a:rPr lang="en-US" dirty="0"/>
+              <a:t>Order Validator</a:t>
+            </a:r>
+          </a:p>
+          <a:p>
+            <a:pPr lvl="2"/>
+            <a:r>
+              <a:rPr lang="en-US" dirty="0"/>
+              <a:t>Order Requester</a:t>
+            </a:r>
+          </a:p>
+          <a:p>
+            <a:pPr lvl="2"/>
+            <a:r>
+              <a:rPr lang="en-US" dirty="0"/>
+              <a:t>Order Canceller</a:t>
+            </a:r>
+          </a:p>
+          <a:p>
+            <a:pPr lvl="2"/>
+            <a:r>
+              <a:rPr lang="en-US" dirty="0"/>
+              <a:t>Order State Manager</a:t>
             </a:r>
           </a:p>
         </p:txBody>
       </p:sp>
       <p:sp>
         <p:nvSpPr>
-          <p:cNvPr id="5" name="Slide Number Placeholder 5">
+          <p:cNvPr id="4" name="Slide Number Placeholder 3">
             <a:extLst>
               <a:ext uri="{FF2B5EF4-FFF2-40B4-BE49-F238E27FC236}">
-                <a16:creationId xmlns:a16="http://schemas.microsoft.com/office/drawing/2014/main" id="{B02A8827-B1A1-2D2F-D6DD-E886B886C43E}"/>
+                <a16:creationId xmlns:a16="http://schemas.microsoft.com/office/drawing/2014/main" id="{49CB9CE0-5A6E-9DC4-0F4F-72D4FB9A125D}"/>
               </a:ext>
             </a:extLst>
           </p:cNvPr>
@@ -15854,23 +16367,18 @@
             <a:spLocks noGrp="1"/>
           </p:cNvSpPr>
           <p:nvPr>
-            <p:ph type="sldNum" sz="quarter" idx="12"/>
+            <p:ph type="sldNum" sz="quarter" idx="4"/>
           </p:nvPr>
         </p:nvSpPr>
-        <p:spPr>
-          <a:xfrm>
-            <a:off x="10373350" y="6356349"/>
-            <a:ext cx="987552" cy="365125"/>
-          </a:xfrm>
-        </p:spPr>
+        <p:spPr/>
         <p:txBody>
           <a:bodyPr/>
           <a:lstStyle/>
           <a:p>
-            <a:fld id="{A49DFD55-3C28-40EF-9E31-A92D2E4017FF}" type="slidenum">
+            <a:fld id="{B5CEABB6-07DC-46E8-9B57-56EC44A396E5}" type="slidenum">
               <a:rPr lang="en-US" smtClean="0"/>
               <a:pPr/>
-              <a:t>2</a:t>
+              <a:t>22</a:t>
             </a:fld>
             <a:endParaRPr lang="en-US" dirty="0"/>
           </a:p>
@@ -15879,7 +16387,7 @@
     </p:spTree>
     <p:extLst>
       <p:ext uri="{BB962C8B-B14F-4D97-AF65-F5344CB8AC3E}">
-        <p14:creationId xmlns:p14="http://schemas.microsoft.com/office/powerpoint/2010/main" val="1713219598"/>
+        <p14:creationId xmlns:p14="http://schemas.microsoft.com/office/powerpoint/2010/main" val="3948655990"/>
       </p:ext>
     </p:extLst>
   </p:cSld>
@@ -15889,7 +16397,7 @@
 </p:sld>
 </file>
 
-<file path=ppt/slides/slide20.xml><?xml version="1.0" encoding="utf-8"?>
+<file path=ppt/slides/slide23.xml><?xml version="1.0" encoding="utf-8"?>
 <p:sld xmlns:a="http://schemas.openxmlformats.org/drawingml/2006/main" xmlns:r="http://schemas.openxmlformats.org/officeDocument/2006/relationships" xmlns:p="http://schemas.openxmlformats.org/presentationml/2006/main">
   <p:cSld>
     <p:spTree>
@@ -16010,7 +16518,7 @@
             <a:fld id="{B5CEABB6-07DC-46E8-9B57-56EC44A396E5}" type="slidenum">
               <a:rPr lang="en-US" smtClean="0"/>
               <a:pPr/>
-              <a:t>20</a:t>
+              <a:t>23</a:t>
             </a:fld>
             <a:endParaRPr lang="en-US" dirty="0"/>
           </a:p>
@@ -16018,10 +16526,10 @@
       </p:sp>
       <p:pic>
         <p:nvPicPr>
-          <p:cNvPr id="4100" name="Picture 4">
+          <p:cNvPr id="4102" name="Picture 6">
             <a:extLst>
               <a:ext uri="{FF2B5EF4-FFF2-40B4-BE49-F238E27FC236}">
-                <a16:creationId xmlns:a16="http://schemas.microsoft.com/office/drawing/2014/main" id="{61467C40-C3BC-0841-CEDC-1BE5C03A3B49}"/>
+                <a16:creationId xmlns:a16="http://schemas.microsoft.com/office/drawing/2014/main" id="{A33A9212-4C4E-AEE9-DAED-AF8CC28D3F19}"/>
               </a:ext>
             </a:extLst>
           </p:cNvPr>
@@ -16045,7 +16553,7 @@
         </p:blipFill>
         <p:spPr bwMode="auto">
           <a:xfrm>
-            <a:off x="4133279" y="1189359"/>
+            <a:off x="4351558" y="1041311"/>
             <a:ext cx="7381875" cy="5353050"/>
           </a:xfrm>
           <a:prstGeom prst="rect">
@@ -16076,7 +16584,7 @@
 </p:sld>
 </file>
 
-<file path=ppt/slides/slide21.xml><?xml version="1.0" encoding="utf-8"?>
+<file path=ppt/slides/slide24.xml><?xml version="1.0" encoding="utf-8"?>
 <p:sld xmlns:a="http://schemas.openxmlformats.org/drawingml/2006/main" xmlns:r="http://schemas.openxmlformats.org/officeDocument/2006/relationships" xmlns:p="http://schemas.openxmlformats.org/presentationml/2006/main">
   <p:cSld>
     <p:spTree>
@@ -16176,7 +16684,7 @@
             <a:fld id="{B5CEABB6-07DC-46E8-9B57-56EC44A396E5}" type="slidenum">
               <a:rPr lang="en-US" smtClean="0"/>
               <a:pPr/>
-              <a:t>21</a:t>
+              <a:t>24</a:t>
             </a:fld>
             <a:endParaRPr lang="en-US" dirty="0"/>
           </a:p>
@@ -16195,7 +16703,7 @@
 </p:sld>
 </file>
 
-<file path=ppt/slides/slide22.xml><?xml version="1.0" encoding="utf-8"?>
+<file path=ppt/slides/slide25.xml><?xml version="1.0" encoding="utf-8"?>
 <p:sld xmlns:a="http://schemas.openxmlformats.org/drawingml/2006/main" xmlns:r="http://schemas.openxmlformats.org/officeDocument/2006/relationships" xmlns:p="http://schemas.openxmlformats.org/presentationml/2006/main">
   <p:cSld>
     <p:bg>

</xml_diff>